<commit_message>
ppt and excel files to expose
</commit_message>
<xml_diff>
--- a/bpdmo_greedy.pptx
+++ b/bpdmo_greedy.pptx
@@ -571,11 +571,11 @@
           <c:showBubbleSize val="0"/>
         </c:dLbls>
         <c:smooth val="0"/>
-        <c:axId val="317276776"/>
-        <c:axId val="317272856"/>
+        <c:axId val="386291712"/>
+        <c:axId val="386287008"/>
       </c:lineChart>
       <c:catAx>
-        <c:axId val="317276776"/>
+        <c:axId val="386291712"/>
         <c:scaling>
           <c:orientation val="minMax"/>
         </c:scaling>
@@ -622,7 +622,7 @@
             <a:endParaRPr lang="es-ES"/>
           </a:p>
         </c:txPr>
-        <c:crossAx val="317272856"/>
+        <c:crossAx val="386287008"/>
         <c:crosses val="autoZero"/>
         <c:auto val="1"/>
         <c:lblAlgn val="ctr"/>
@@ -630,7 +630,7 @@
         <c:noMultiLvlLbl val="0"/>
       </c:catAx>
       <c:valAx>
-        <c:axId val="317272856"/>
+        <c:axId val="386287008"/>
         <c:scaling>
           <c:orientation val="minMax"/>
         </c:scaling>
@@ -686,7 +686,7 @@
             <a:endParaRPr lang="es-ES"/>
           </a:p>
         </c:txPr>
-        <c:crossAx val="317276776"/>
+        <c:crossAx val="386291712"/>
         <c:crosses val="autoZero"/>
         <c:crossBetween val="between"/>
       </c:valAx>
@@ -1176,11 +1176,11 @@
           <c:showBubbleSize val="0"/>
         </c:dLbls>
         <c:smooth val="0"/>
-        <c:axId val="359514464"/>
-        <c:axId val="359512504"/>
+        <c:axId val="386292104"/>
+        <c:axId val="386284656"/>
       </c:lineChart>
       <c:catAx>
-        <c:axId val="359514464"/>
+        <c:axId val="386292104"/>
         <c:scaling>
           <c:orientation val="minMax"/>
         </c:scaling>
@@ -1227,7 +1227,7 @@
             <a:endParaRPr lang="es-ES"/>
           </a:p>
         </c:txPr>
-        <c:crossAx val="359512504"/>
+        <c:crossAx val="386284656"/>
         <c:crosses val="autoZero"/>
         <c:auto val="1"/>
         <c:lblAlgn val="ctr"/>
@@ -1235,7 +1235,7 @@
         <c:noMultiLvlLbl val="0"/>
       </c:catAx>
       <c:valAx>
-        <c:axId val="359512504"/>
+        <c:axId val="386284656"/>
         <c:scaling>
           <c:orientation val="minMax"/>
         </c:scaling>
@@ -1291,7 +1291,7 @@
             <a:endParaRPr lang="es-ES"/>
           </a:p>
         </c:txPr>
-        <c:crossAx val="359514464"/>
+        <c:crossAx val="386292104"/>
         <c:crosses val="autoZero"/>
         <c:crossBetween val="between"/>
       </c:valAx>
@@ -1836,11 +1836,11 @@
           <c:showBubbleSize val="0"/>
         </c:dLbls>
         <c:smooth val="0"/>
-        <c:axId val="359511328"/>
-        <c:axId val="359513288"/>
+        <c:axId val="460327736"/>
+        <c:axId val="460756776"/>
       </c:lineChart>
       <c:catAx>
-        <c:axId val="359511328"/>
+        <c:axId val="460327736"/>
         <c:scaling>
           <c:orientation val="minMax"/>
         </c:scaling>
@@ -1887,7 +1887,7 @@
             <a:endParaRPr lang="es-ES"/>
           </a:p>
         </c:txPr>
-        <c:crossAx val="359513288"/>
+        <c:crossAx val="460756776"/>
         <c:crosses val="autoZero"/>
         <c:auto val="1"/>
         <c:lblAlgn val="ctr"/>
@@ -1895,7 +1895,7 @@
         <c:noMultiLvlLbl val="0"/>
       </c:catAx>
       <c:valAx>
-        <c:axId val="359513288"/>
+        <c:axId val="460756776"/>
         <c:scaling>
           <c:orientation val="minMax"/>
         </c:scaling>
@@ -1951,7 +1951,7 @@
             <a:endParaRPr lang="es-ES"/>
           </a:p>
         </c:txPr>
-        <c:crossAx val="359511328"/>
+        <c:crossAx val="460327736"/>
         <c:crosses val="autoZero"/>
         <c:crossBetween val="between"/>
       </c:valAx>
@@ -2443,11 +2443,11 @@
           <c:showBubbleSize val="0"/>
         </c:dLbls>
         <c:smooth val="0"/>
-        <c:axId val="361927888"/>
-        <c:axId val="361925536"/>
+        <c:axId val="460757560"/>
+        <c:axId val="460757168"/>
       </c:lineChart>
       <c:catAx>
-        <c:axId val="361927888"/>
+        <c:axId val="460757560"/>
         <c:scaling>
           <c:orientation val="minMax"/>
         </c:scaling>
@@ -2494,7 +2494,7 @@
             <a:endParaRPr lang="es-ES"/>
           </a:p>
         </c:txPr>
-        <c:crossAx val="361925536"/>
+        <c:crossAx val="460757168"/>
         <c:crosses val="autoZero"/>
         <c:auto val="1"/>
         <c:lblAlgn val="ctr"/>
@@ -2502,7 +2502,7 @@
         <c:noMultiLvlLbl val="0"/>
       </c:catAx>
       <c:valAx>
-        <c:axId val="361925536"/>
+        <c:axId val="460757168"/>
         <c:scaling>
           <c:orientation val="minMax"/>
         </c:scaling>
@@ -2558,7 +2558,7 @@
             <a:endParaRPr lang="es-ES"/>
           </a:p>
         </c:txPr>
-        <c:crossAx val="361927888"/>
+        <c:crossAx val="460757560"/>
         <c:crosses val="autoZero"/>
         <c:crossBetween val="between"/>
       </c:valAx>
@@ -3047,11 +3047,11 @@
           <c:showBubbleSize val="0"/>
         </c:dLbls>
         <c:smooth val="0"/>
-        <c:axId val="361928280"/>
-        <c:axId val="361931808"/>
+        <c:axId val="460752856"/>
+        <c:axId val="460755992"/>
       </c:lineChart>
       <c:catAx>
-        <c:axId val="361928280"/>
+        <c:axId val="460752856"/>
         <c:scaling>
           <c:orientation val="minMax"/>
         </c:scaling>
@@ -3098,7 +3098,7 @@
             <a:endParaRPr lang="es-ES"/>
           </a:p>
         </c:txPr>
-        <c:crossAx val="361931808"/>
+        <c:crossAx val="460755992"/>
         <c:crosses val="autoZero"/>
         <c:auto val="1"/>
         <c:lblAlgn val="ctr"/>
@@ -3106,7 +3106,7 @@
         <c:noMultiLvlLbl val="0"/>
       </c:catAx>
       <c:valAx>
-        <c:axId val="361931808"/>
+        <c:axId val="460755992"/>
         <c:scaling>
           <c:orientation val="minMax"/>
         </c:scaling>
@@ -3162,7 +3162,7 @@
             <a:endParaRPr lang="es-ES"/>
           </a:p>
         </c:txPr>
-        <c:crossAx val="361928280"/>
+        <c:crossAx val="460752856"/>
         <c:crosses val="autoZero"/>
         <c:crossBetween val="between"/>
       </c:valAx>
@@ -3651,11 +3651,11 @@
           <c:showBubbleSize val="0"/>
         </c:dLbls>
         <c:smooth val="0"/>
-        <c:axId val="361930632"/>
-        <c:axId val="361932200"/>
+        <c:axId val="460757952"/>
+        <c:axId val="460752072"/>
       </c:lineChart>
       <c:catAx>
-        <c:axId val="361930632"/>
+        <c:axId val="460757952"/>
         <c:scaling>
           <c:orientation val="minMax"/>
         </c:scaling>
@@ -3702,7 +3702,7 @@
             <a:endParaRPr lang="es-ES"/>
           </a:p>
         </c:txPr>
-        <c:crossAx val="361932200"/>
+        <c:crossAx val="460752072"/>
         <c:crosses val="autoZero"/>
         <c:auto val="1"/>
         <c:lblAlgn val="ctr"/>
@@ -3710,7 +3710,7 @@
         <c:noMultiLvlLbl val="0"/>
       </c:catAx>
       <c:valAx>
-        <c:axId val="361932200"/>
+        <c:axId val="460752072"/>
         <c:scaling>
           <c:orientation val="minMax"/>
         </c:scaling>
@@ -3766,7 +3766,7 @@
             <a:endParaRPr lang="es-ES"/>
           </a:p>
         </c:txPr>
-        <c:crossAx val="361930632"/>
+        <c:crossAx val="460757952"/>
         <c:crosses val="autoZero"/>
         <c:crossBetween val="between"/>
       </c:valAx>
@@ -3887,7 +3887,6 @@
           </a:p>
         </c:rich>
       </c:tx>
-      <c:layout/>
       <c:overlay val="0"/>
       <c:spPr>
         <a:noFill/>
@@ -4736,11 +4735,11 @@
           <c:showBubbleSize val="0"/>
         </c:dLbls>
         <c:smooth val="0"/>
-        <c:axId val="361928672"/>
-        <c:axId val="361931024"/>
+        <c:axId val="460758344"/>
+        <c:axId val="460756384"/>
       </c:lineChart>
       <c:catAx>
-        <c:axId val="361928672"/>
+        <c:axId val="460758344"/>
         <c:scaling>
           <c:orientation val="minMax"/>
         </c:scaling>
@@ -4787,7 +4786,7 @@
             <a:endParaRPr lang="es-ES"/>
           </a:p>
         </c:txPr>
-        <c:crossAx val="361931024"/>
+        <c:crossAx val="460756384"/>
         <c:crosses val="autoZero"/>
         <c:auto val="1"/>
         <c:lblAlgn val="ctr"/>
@@ -4795,7 +4794,7 @@
         <c:noMultiLvlLbl val="0"/>
       </c:catAx>
       <c:valAx>
-        <c:axId val="361931024"/>
+        <c:axId val="460756384"/>
         <c:scaling>
           <c:orientation val="minMax"/>
         </c:scaling>
@@ -4851,7 +4850,7 @@
             <a:endParaRPr lang="es-ES"/>
           </a:p>
         </c:txPr>
-        <c:crossAx val="361928672"/>
+        <c:crossAx val="460758344"/>
         <c:crosses val="autoZero"/>
         <c:crossBetween val="between"/>
       </c:valAx>
@@ -4865,7 +4864,6 @@
     </c:plotArea>
     <c:legend>
       <c:legendPos val="b"/>
-      <c:layout/>
       <c:overlay val="0"/>
       <c:spPr>
         <a:noFill/>
@@ -5015,7 +5013,6 @@
           </a:p>
         </c:rich>
       </c:tx>
-      <c:layout/>
       <c:overlay val="0"/>
       <c:spPr>
         <a:noFill/>
@@ -5867,11 +5864,11 @@
           <c:showBubbleSize val="0"/>
         </c:dLbls>
         <c:smooth val="0"/>
-        <c:axId val="361925928"/>
-        <c:axId val="361926320"/>
+        <c:axId val="460751288"/>
+        <c:axId val="460754424"/>
       </c:lineChart>
       <c:catAx>
-        <c:axId val="361925928"/>
+        <c:axId val="460751288"/>
         <c:scaling>
           <c:orientation val="minMax"/>
         </c:scaling>
@@ -5918,7 +5915,7 @@
             <a:endParaRPr lang="es-ES"/>
           </a:p>
         </c:txPr>
-        <c:crossAx val="361926320"/>
+        <c:crossAx val="460754424"/>
         <c:crosses val="autoZero"/>
         <c:auto val="1"/>
         <c:lblAlgn val="ctr"/>
@@ -5926,7 +5923,7 @@
         <c:noMultiLvlLbl val="0"/>
       </c:catAx>
       <c:valAx>
-        <c:axId val="361926320"/>
+        <c:axId val="460754424"/>
         <c:scaling>
           <c:orientation val="minMax"/>
         </c:scaling>
@@ -5982,7 +5979,7 @@
             <a:endParaRPr lang="es-ES"/>
           </a:p>
         </c:txPr>
-        <c:crossAx val="361925928"/>
+        <c:crossAx val="460751288"/>
         <c:crosses val="autoZero"/>
         <c:crossBetween val="between"/>
       </c:valAx>
@@ -5996,7 +5993,6 @@
     </c:plotArea>
     <c:legend>
       <c:legendPos val="b"/>
-      <c:layout/>
       <c:overlay val="0"/>
       <c:spPr>
         <a:noFill/>
@@ -11719,6 +11715,606 @@
       <dsp:cNvGrpSpPr/>
     </dsp:nvGrpSpPr>
     <dsp:grpSpPr/>
+    <dsp:sp modelId="{6B08AC4B-4CEC-41E5-AE19-47A4E2720563}">
+      <dsp:nvSpPr>
+        <dsp:cNvPr id="0" name=""/>
+        <dsp:cNvSpPr/>
+      </dsp:nvSpPr>
+      <dsp:spPr>
+        <a:xfrm>
+          <a:off x="155869" y="1151234"/>
+          <a:ext cx="1935105" cy="881104"/>
+        </a:xfrm>
+        <a:prstGeom prst="rect">
+          <a:avLst/>
+        </a:prstGeom>
+        <a:solidFill>
+          <a:schemeClr val="bg1">
+            <a:lumMod val="95000"/>
+            <a:alpha val="90000"/>
+          </a:schemeClr>
+        </a:solidFill>
+        <a:ln w="6350" cap="rnd" cmpd="sng" algn="ctr">
+          <a:solidFill>
+            <a:schemeClr val="accent1">
+              <a:alpha val="90000"/>
+              <a:tint val="40000"/>
+              <a:hueOff val="0"/>
+              <a:satOff val="0"/>
+              <a:lumOff val="0"/>
+              <a:alphaOff val="0"/>
+            </a:schemeClr>
+          </a:solidFill>
+          <a:prstDash val="solid"/>
+        </a:ln>
+        <a:effectLst/>
+      </dsp:spPr>
+      <dsp:style>
+        <a:lnRef idx="1">
+          <a:scrgbClr r="0" g="0" b="0"/>
+        </a:lnRef>
+        <a:fillRef idx="1">
+          <a:scrgbClr r="0" g="0" b="0"/>
+        </a:fillRef>
+        <a:effectRef idx="0">
+          <a:scrgbClr r="0" g="0" b="0"/>
+        </a:effectRef>
+        <a:fontRef idx="minor"/>
+      </dsp:style>
+    </dsp:sp>
+    <dsp:sp modelId="{FC7ED273-8CFD-43C2-9C05-44FADF3E0637}">
+      <dsp:nvSpPr>
+        <dsp:cNvPr id="0" name=""/>
+        <dsp:cNvSpPr/>
+      </dsp:nvSpPr>
+      <dsp:spPr>
+        <a:xfrm>
+          <a:off x="-79831" y="227644"/>
+          <a:ext cx="951647" cy="951647"/>
+        </a:xfrm>
+        <a:prstGeom prst="ellipse">
+          <a:avLst/>
+        </a:prstGeom>
+        <a:gradFill rotWithShape="0">
+          <a:gsLst>
+            <a:gs pos="0">
+              <a:schemeClr val="accent1">
+                <a:hueOff val="0"/>
+                <a:satOff val="0"/>
+                <a:lumOff val="0"/>
+                <a:alphaOff val="0"/>
+                <a:shade val="100000"/>
+                <a:satMod val="137000"/>
+              </a:schemeClr>
+            </a:gs>
+            <a:gs pos="71000">
+              <a:schemeClr val="accent1">
+                <a:hueOff val="0"/>
+                <a:satOff val="0"/>
+                <a:lumOff val="0"/>
+                <a:alphaOff val="0"/>
+                <a:shade val="98000"/>
+                <a:satMod val="137000"/>
+              </a:schemeClr>
+            </a:gs>
+            <a:gs pos="100000">
+              <a:schemeClr val="accent1">
+                <a:hueOff val="0"/>
+                <a:satOff val="0"/>
+                <a:lumOff val="0"/>
+                <a:alphaOff val="0"/>
+                <a:shade val="75000"/>
+                <a:satMod val="137000"/>
+              </a:schemeClr>
+            </a:gs>
+          </a:gsLst>
+          <a:path path="rect">
+            <a:fillToRect l="50000" t="50000" r="50000" b="50000"/>
+          </a:path>
+        </a:gradFill>
+        <a:ln>
+          <a:noFill/>
+        </a:ln>
+        <a:effectLst>
+          <a:outerShdw blurRad="39000" dist="25400" dir="5400000" rotWithShape="0">
+            <a:srgbClr val="000000">
+              <a:alpha val="38000"/>
+            </a:srgbClr>
+          </a:outerShdw>
+        </a:effectLst>
+      </dsp:spPr>
+      <dsp:style>
+        <a:lnRef idx="0">
+          <a:scrgbClr r="0" g="0" b="0"/>
+        </a:lnRef>
+        <a:fillRef idx="3">
+          <a:scrgbClr r="0" g="0" b="0"/>
+        </a:fillRef>
+        <a:effectRef idx="2">
+          <a:scrgbClr r="0" g="0" b="0"/>
+        </a:effectRef>
+        <a:fontRef idx="minor">
+          <a:schemeClr val="lt1"/>
+        </a:fontRef>
+      </dsp:style>
+      <dsp:txBody>
+        <a:bodyPr spcFirstLastPara="0" vert="horz" wrap="square" lIns="0" tIns="0" rIns="0" bIns="0" numCol="1" spcCol="1270" rtlCol="0" anchor="ctr" anchorCtr="0">
+          <a:noAutofit/>
+        </a:bodyPr>
+        <a:lstStyle/>
+        <a:p>
+          <a:pPr lvl="0" algn="ctr" defTabSz="1822450" rtl="0">
+            <a:lnSpc>
+              <a:spcPct val="90000"/>
+            </a:lnSpc>
+            <a:spcBef>
+              <a:spcPct val="0"/>
+            </a:spcBef>
+            <a:spcAft>
+              <a:spcPct val="35000"/>
+            </a:spcAft>
+          </a:pPr>
+          <a:r>
+            <a:rPr lang="es-ES" sz="4100" kern="1200" noProof="0" dirty="0"/>
+            <a:t>C1</a:t>
+          </a:r>
+        </a:p>
+      </dsp:txBody>
+      <dsp:txXfrm>
+        <a:off x="59534" y="367009"/>
+        <a:ext cx="672917" cy="672917"/>
+      </dsp:txXfrm>
+    </dsp:sp>
+    <dsp:sp modelId="{F660F4B9-35DB-4256-A868-A35C6DCCF6B2}">
+      <dsp:nvSpPr>
+        <dsp:cNvPr id="0" name=""/>
+        <dsp:cNvSpPr/>
+      </dsp:nvSpPr>
+      <dsp:spPr>
+        <a:xfrm>
+          <a:off x="2655135" y="1130668"/>
+          <a:ext cx="1957708" cy="914333"/>
+        </a:xfrm>
+        <a:prstGeom prst="rect">
+          <a:avLst/>
+        </a:prstGeom>
+        <a:solidFill>
+          <a:schemeClr val="bg1">
+            <a:lumMod val="95000"/>
+            <a:alpha val="90000"/>
+          </a:schemeClr>
+        </a:solidFill>
+        <a:ln w="6350" cap="rnd" cmpd="sng" algn="ctr">
+          <a:solidFill>
+            <a:schemeClr val="accent1">
+              <a:alpha val="90000"/>
+              <a:tint val="40000"/>
+              <a:hueOff val="0"/>
+              <a:satOff val="0"/>
+              <a:lumOff val="0"/>
+              <a:alphaOff val="0"/>
+            </a:schemeClr>
+          </a:solidFill>
+          <a:prstDash val="solid"/>
+        </a:ln>
+        <a:effectLst/>
+      </dsp:spPr>
+      <dsp:style>
+        <a:lnRef idx="1">
+          <a:scrgbClr r="0" g="0" b="0"/>
+        </a:lnRef>
+        <a:fillRef idx="1">
+          <a:scrgbClr r="0" g="0" b="0"/>
+        </a:fillRef>
+        <a:effectRef idx="0">
+          <a:scrgbClr r="0" g="0" b="0"/>
+        </a:effectRef>
+        <a:fontRef idx="minor"/>
+      </dsp:style>
+    </dsp:sp>
+    <dsp:sp modelId="{FD776C1E-557E-4553-9447-49B69EEC7907}">
+      <dsp:nvSpPr>
+        <dsp:cNvPr id="0" name=""/>
+        <dsp:cNvSpPr/>
+      </dsp:nvSpPr>
+      <dsp:spPr>
+        <a:xfrm>
+          <a:off x="2077218" y="254329"/>
+          <a:ext cx="951647" cy="951647"/>
+        </a:xfrm>
+        <a:prstGeom prst="ellipse">
+          <a:avLst/>
+        </a:prstGeom>
+        <a:gradFill rotWithShape="0">
+          <a:gsLst>
+            <a:gs pos="0">
+              <a:schemeClr val="accent1">
+                <a:hueOff val="0"/>
+                <a:satOff val="0"/>
+                <a:lumOff val="0"/>
+                <a:alphaOff val="0"/>
+                <a:shade val="100000"/>
+                <a:satMod val="137000"/>
+              </a:schemeClr>
+            </a:gs>
+            <a:gs pos="71000">
+              <a:schemeClr val="accent1">
+                <a:hueOff val="0"/>
+                <a:satOff val="0"/>
+                <a:lumOff val="0"/>
+                <a:alphaOff val="0"/>
+                <a:shade val="98000"/>
+                <a:satMod val="137000"/>
+              </a:schemeClr>
+            </a:gs>
+            <a:gs pos="100000">
+              <a:schemeClr val="accent1">
+                <a:hueOff val="0"/>
+                <a:satOff val="0"/>
+                <a:lumOff val="0"/>
+                <a:alphaOff val="0"/>
+                <a:shade val="75000"/>
+                <a:satMod val="137000"/>
+              </a:schemeClr>
+            </a:gs>
+          </a:gsLst>
+          <a:path path="rect">
+            <a:fillToRect l="50000" t="50000" r="50000" b="50000"/>
+          </a:path>
+        </a:gradFill>
+        <a:ln>
+          <a:noFill/>
+        </a:ln>
+        <a:effectLst>
+          <a:outerShdw blurRad="39000" dist="25400" dir="5400000" rotWithShape="0">
+            <a:srgbClr val="000000">
+              <a:alpha val="38000"/>
+            </a:srgbClr>
+          </a:outerShdw>
+        </a:effectLst>
+      </dsp:spPr>
+      <dsp:style>
+        <a:lnRef idx="0">
+          <a:scrgbClr r="0" g="0" b="0"/>
+        </a:lnRef>
+        <a:fillRef idx="3">
+          <a:scrgbClr r="0" g="0" b="0"/>
+        </a:fillRef>
+        <a:effectRef idx="2">
+          <a:scrgbClr r="0" g="0" b="0"/>
+        </a:effectRef>
+        <a:fontRef idx="minor">
+          <a:schemeClr val="lt1"/>
+        </a:fontRef>
+      </dsp:style>
+      <dsp:txBody>
+        <a:bodyPr spcFirstLastPara="0" vert="horz" wrap="square" lIns="0" tIns="0" rIns="0" bIns="0" numCol="1" spcCol="1270" rtlCol="0" anchor="ctr" anchorCtr="0">
+          <a:noAutofit/>
+        </a:bodyPr>
+        <a:lstStyle/>
+        <a:p>
+          <a:pPr lvl="0" algn="r" defTabSz="1822450" rtl="0">
+            <a:lnSpc>
+              <a:spcPct val="90000"/>
+            </a:lnSpc>
+            <a:spcBef>
+              <a:spcPct val="0"/>
+            </a:spcBef>
+            <a:spcAft>
+              <a:spcPct val="35000"/>
+            </a:spcAft>
+          </a:pPr>
+          <a:r>
+            <a:rPr lang="es-ES" sz="4100" kern="1200" noProof="0" dirty="0"/>
+            <a:t>C2</a:t>
+          </a:r>
+        </a:p>
+      </dsp:txBody>
+      <dsp:txXfrm>
+        <a:off x="2216583" y="393694"/>
+        <a:ext cx="672917" cy="672917"/>
+      </dsp:txXfrm>
+    </dsp:sp>
+    <dsp:sp modelId="{AD2806AC-6A03-4F05-9F4D-F72EA0E56FBF}">
+      <dsp:nvSpPr>
+        <dsp:cNvPr id="0" name=""/>
+        <dsp:cNvSpPr/>
+      </dsp:nvSpPr>
+      <dsp:spPr>
+        <a:xfrm>
+          <a:off x="5226455" y="1151330"/>
+          <a:ext cx="2010348" cy="882780"/>
+        </a:xfrm>
+        <a:prstGeom prst="rect">
+          <a:avLst/>
+        </a:prstGeom>
+        <a:solidFill>
+          <a:schemeClr val="bg1">
+            <a:lumMod val="95000"/>
+            <a:alpha val="90000"/>
+          </a:schemeClr>
+        </a:solidFill>
+        <a:ln w="6350" cap="rnd" cmpd="sng" algn="ctr">
+          <a:solidFill>
+            <a:schemeClr val="accent1">
+              <a:alpha val="90000"/>
+              <a:tint val="40000"/>
+              <a:hueOff val="0"/>
+              <a:satOff val="0"/>
+              <a:lumOff val="0"/>
+              <a:alphaOff val="0"/>
+            </a:schemeClr>
+          </a:solidFill>
+          <a:prstDash val="solid"/>
+        </a:ln>
+        <a:effectLst/>
+      </dsp:spPr>
+      <dsp:style>
+        <a:lnRef idx="1">
+          <a:scrgbClr r="0" g="0" b="0"/>
+        </a:lnRef>
+        <a:fillRef idx="1">
+          <a:scrgbClr r="0" g="0" b="0"/>
+        </a:fillRef>
+        <a:effectRef idx="0">
+          <a:scrgbClr r="0" g="0" b="0"/>
+        </a:effectRef>
+        <a:fontRef idx="minor"/>
+      </dsp:style>
+    </dsp:sp>
+    <dsp:sp modelId="{89E6DA6E-7A23-44BD-8A99-378091FF741D}">
+      <dsp:nvSpPr>
+        <dsp:cNvPr id="0" name=""/>
+        <dsp:cNvSpPr/>
+      </dsp:nvSpPr>
+      <dsp:spPr>
+        <a:xfrm>
+          <a:off x="4583780" y="292480"/>
+          <a:ext cx="951647" cy="951647"/>
+        </a:xfrm>
+        <a:prstGeom prst="ellipse">
+          <a:avLst/>
+        </a:prstGeom>
+        <a:gradFill rotWithShape="0">
+          <a:gsLst>
+            <a:gs pos="0">
+              <a:schemeClr val="accent1">
+                <a:hueOff val="0"/>
+                <a:satOff val="0"/>
+                <a:lumOff val="0"/>
+                <a:alphaOff val="0"/>
+                <a:shade val="100000"/>
+                <a:satMod val="137000"/>
+              </a:schemeClr>
+            </a:gs>
+            <a:gs pos="71000">
+              <a:schemeClr val="accent1">
+                <a:hueOff val="0"/>
+                <a:satOff val="0"/>
+                <a:lumOff val="0"/>
+                <a:alphaOff val="0"/>
+                <a:shade val="98000"/>
+                <a:satMod val="137000"/>
+              </a:schemeClr>
+            </a:gs>
+            <a:gs pos="100000">
+              <a:schemeClr val="accent1">
+                <a:hueOff val="0"/>
+                <a:satOff val="0"/>
+                <a:lumOff val="0"/>
+                <a:alphaOff val="0"/>
+                <a:shade val="75000"/>
+                <a:satMod val="137000"/>
+              </a:schemeClr>
+            </a:gs>
+          </a:gsLst>
+          <a:path path="rect">
+            <a:fillToRect l="50000" t="50000" r="50000" b="50000"/>
+          </a:path>
+        </a:gradFill>
+        <a:ln>
+          <a:noFill/>
+        </a:ln>
+        <a:effectLst>
+          <a:outerShdw blurRad="39000" dist="25400" dir="5400000" rotWithShape="0">
+            <a:srgbClr val="000000">
+              <a:alpha val="38000"/>
+            </a:srgbClr>
+          </a:outerShdw>
+        </a:effectLst>
+      </dsp:spPr>
+      <dsp:style>
+        <a:lnRef idx="0">
+          <a:scrgbClr r="0" g="0" b="0"/>
+        </a:lnRef>
+        <a:fillRef idx="3">
+          <a:scrgbClr r="0" g="0" b="0"/>
+        </a:fillRef>
+        <a:effectRef idx="2">
+          <a:scrgbClr r="0" g="0" b="0"/>
+        </a:effectRef>
+        <a:fontRef idx="minor">
+          <a:schemeClr val="lt1"/>
+        </a:fontRef>
+      </dsp:style>
+      <dsp:txBody>
+        <a:bodyPr spcFirstLastPara="0" vert="horz" wrap="square" lIns="0" tIns="0" rIns="0" bIns="0" numCol="1" spcCol="1270" rtlCol="0" anchor="ctr" anchorCtr="0">
+          <a:noAutofit/>
+        </a:bodyPr>
+        <a:lstStyle/>
+        <a:p>
+          <a:pPr lvl="0" algn="ctr" defTabSz="1822450" rtl="0">
+            <a:lnSpc>
+              <a:spcPct val="90000"/>
+            </a:lnSpc>
+            <a:spcBef>
+              <a:spcPct val="0"/>
+            </a:spcBef>
+            <a:spcAft>
+              <a:spcPct val="35000"/>
+            </a:spcAft>
+          </a:pPr>
+          <a:r>
+            <a:rPr lang="es-ES" sz="4100" kern="1200" noProof="0" dirty="0"/>
+            <a:t>C3</a:t>
+          </a:r>
+        </a:p>
+      </dsp:txBody>
+      <dsp:txXfrm>
+        <a:off x="4723145" y="431845"/>
+        <a:ext cx="672917" cy="672917"/>
+      </dsp:txXfrm>
+    </dsp:sp>
+    <dsp:sp modelId="{402C2C77-A32C-4D99-9940-12535E1181F2}">
+      <dsp:nvSpPr>
+        <dsp:cNvPr id="0" name=""/>
+        <dsp:cNvSpPr/>
+      </dsp:nvSpPr>
+      <dsp:spPr>
+        <a:xfrm>
+          <a:off x="7872141" y="1083310"/>
+          <a:ext cx="1994894" cy="950800"/>
+        </a:xfrm>
+        <a:prstGeom prst="rect">
+          <a:avLst/>
+        </a:prstGeom>
+        <a:solidFill>
+          <a:schemeClr val="bg1">
+            <a:lumMod val="95000"/>
+            <a:alpha val="90000"/>
+          </a:schemeClr>
+        </a:solidFill>
+        <a:ln w="6350" cap="rnd" cmpd="sng" algn="ctr">
+          <a:solidFill>
+            <a:schemeClr val="accent1">
+              <a:alpha val="90000"/>
+              <a:tint val="40000"/>
+              <a:hueOff val="0"/>
+              <a:satOff val="0"/>
+              <a:lumOff val="0"/>
+              <a:alphaOff val="0"/>
+            </a:schemeClr>
+          </a:solidFill>
+          <a:prstDash val="solid"/>
+        </a:ln>
+        <a:effectLst/>
+      </dsp:spPr>
+      <dsp:style>
+        <a:lnRef idx="1">
+          <a:scrgbClr r="0" g="0" b="0"/>
+        </a:lnRef>
+        <a:fillRef idx="1">
+          <a:scrgbClr r="0" g="0" b="0"/>
+        </a:fillRef>
+        <a:effectRef idx="0">
+          <a:scrgbClr r="0" g="0" b="0"/>
+        </a:effectRef>
+        <a:fontRef idx="minor"/>
+      </dsp:style>
+    </dsp:sp>
+    <dsp:sp modelId="{7453D9C8-CD6E-4AA4-8A19-7F6F667528F0}">
+      <dsp:nvSpPr>
+        <dsp:cNvPr id="0" name=""/>
+        <dsp:cNvSpPr/>
+      </dsp:nvSpPr>
+      <dsp:spPr>
+        <a:xfrm>
+          <a:off x="7107481" y="265054"/>
+          <a:ext cx="951647" cy="951647"/>
+        </a:xfrm>
+        <a:prstGeom prst="ellipse">
+          <a:avLst/>
+        </a:prstGeom>
+        <a:gradFill rotWithShape="0">
+          <a:gsLst>
+            <a:gs pos="0">
+              <a:schemeClr val="accent1">
+                <a:hueOff val="0"/>
+                <a:satOff val="0"/>
+                <a:lumOff val="0"/>
+                <a:alphaOff val="0"/>
+                <a:shade val="100000"/>
+                <a:satMod val="137000"/>
+              </a:schemeClr>
+            </a:gs>
+            <a:gs pos="71000">
+              <a:schemeClr val="accent1">
+                <a:hueOff val="0"/>
+                <a:satOff val="0"/>
+                <a:lumOff val="0"/>
+                <a:alphaOff val="0"/>
+                <a:shade val="98000"/>
+                <a:satMod val="137000"/>
+              </a:schemeClr>
+            </a:gs>
+            <a:gs pos="100000">
+              <a:schemeClr val="accent1">
+                <a:hueOff val="0"/>
+                <a:satOff val="0"/>
+                <a:lumOff val="0"/>
+                <a:alphaOff val="0"/>
+                <a:shade val="75000"/>
+                <a:satMod val="137000"/>
+              </a:schemeClr>
+            </a:gs>
+          </a:gsLst>
+          <a:path path="rect">
+            <a:fillToRect l="50000" t="50000" r="50000" b="50000"/>
+          </a:path>
+        </a:gradFill>
+        <a:ln>
+          <a:noFill/>
+        </a:ln>
+        <a:effectLst>
+          <a:outerShdw blurRad="39000" dist="25400" dir="5400000" rotWithShape="0">
+            <a:srgbClr val="000000">
+              <a:alpha val="38000"/>
+            </a:srgbClr>
+          </a:outerShdw>
+        </a:effectLst>
+      </dsp:spPr>
+      <dsp:style>
+        <a:lnRef idx="0">
+          <a:scrgbClr r="0" g="0" b="0"/>
+        </a:lnRef>
+        <a:fillRef idx="3">
+          <a:scrgbClr r="0" g="0" b="0"/>
+        </a:fillRef>
+        <a:effectRef idx="2">
+          <a:scrgbClr r="0" g="0" b="0"/>
+        </a:effectRef>
+        <a:fontRef idx="minor">
+          <a:schemeClr val="lt1"/>
+        </a:fontRef>
+      </dsp:style>
+      <dsp:txBody>
+        <a:bodyPr spcFirstLastPara="0" vert="horz" wrap="square" lIns="0" tIns="0" rIns="0" bIns="0" numCol="1" spcCol="1270" rtlCol="0" anchor="ctr" anchorCtr="0">
+          <a:noAutofit/>
+        </a:bodyPr>
+        <a:lstStyle/>
+        <a:p>
+          <a:pPr lvl="0" algn="ctr" defTabSz="1822450" rtl="0">
+            <a:lnSpc>
+              <a:spcPct val="90000"/>
+            </a:lnSpc>
+            <a:spcBef>
+              <a:spcPct val="0"/>
+            </a:spcBef>
+            <a:spcAft>
+              <a:spcPct val="35000"/>
+            </a:spcAft>
+          </a:pPr>
+          <a:r>
+            <a:rPr lang="es-ES" sz="4100" kern="1200" noProof="0" dirty="0"/>
+            <a:t>C4</a:t>
+          </a:r>
+        </a:p>
+      </dsp:txBody>
+      <dsp:txXfrm>
+        <a:off x="7246846" y="404419"/>
+        <a:ext cx="672917" cy="672917"/>
+      </dsp:txXfrm>
+    </dsp:sp>
   </dsp:spTree>
 </dsp:drawing>
 </file>
@@ -25214,7 +25810,7 @@
           <p:cNvPr id="8" name="Picture Placeholder 7">
             <a:extLst>
               <a:ext uri="{FF2B5EF4-FFF2-40B4-BE49-F238E27FC236}">
-                <a16:creationId xmlns="" xmlns:a16="http://schemas.microsoft.com/office/drawing/2014/main" id="{59D3FB41-A110-499A-B291-BBBB8318935F}"/>
+                <a16:creationId xmlns:a16="http://schemas.microsoft.com/office/drawing/2014/main" xmlns="" id="{59D3FB41-A110-499A-B291-BBBB8318935F}"/>
               </a:ext>
             </a:extLst>
           </p:cNvPr>
@@ -25294,7 +25890,7 @@
           <p:cNvPr id="4" name="Table 3">
             <a:extLst>
               <a:ext uri="{FF2B5EF4-FFF2-40B4-BE49-F238E27FC236}">
-                <a16:creationId xmlns:a16="http://schemas.microsoft.com/office/drawing/2014/main" xmlns="" id="{16CA9473-8F0D-4C48-BB9A-8EE40BF50D92}"/>
+                <a16:creationId xmlns="" xmlns:a16="http://schemas.microsoft.com/office/drawing/2014/main" id="{16CA9473-8F0D-4C48-BB9A-8EE40BF50D92}"/>
               </a:ext>
             </a:extLst>
           </p:cNvPr>
@@ -25323,63 +25919,63 @@
                 <a:gridCol w="1001021">
                   <a:extLst>
                     <a:ext uri="{9D8B030D-6E8A-4147-A177-3AD203B41FA5}">
-                      <a16:colId xmlns:a16="http://schemas.microsoft.com/office/drawing/2014/main" xmlns="" val="34760263"/>
+                      <a16:colId xmlns="" xmlns:a16="http://schemas.microsoft.com/office/drawing/2014/main" val="34760263"/>
                     </a:ext>
                   </a:extLst>
                 </a:gridCol>
                 <a:gridCol w="855273">
                   <a:extLst>
                     <a:ext uri="{9D8B030D-6E8A-4147-A177-3AD203B41FA5}">
-                      <a16:colId xmlns:a16="http://schemas.microsoft.com/office/drawing/2014/main" xmlns="" val="3812687379"/>
+                      <a16:colId xmlns="" xmlns:a16="http://schemas.microsoft.com/office/drawing/2014/main" val="3812687379"/>
                     </a:ext>
                   </a:extLst>
                 </a:gridCol>
                 <a:gridCol w="1315753">
                   <a:extLst>
                     <a:ext uri="{9D8B030D-6E8A-4147-A177-3AD203B41FA5}">
-                      <a16:colId xmlns:a16="http://schemas.microsoft.com/office/drawing/2014/main" xmlns="" val="1933821378"/>
+                      <a16:colId xmlns="" xmlns:a16="http://schemas.microsoft.com/office/drawing/2014/main" val="1933821378"/>
                     </a:ext>
                   </a:extLst>
                 </a:gridCol>
                 <a:gridCol w="1728370">
                   <a:extLst>
                     <a:ext uri="{9D8B030D-6E8A-4147-A177-3AD203B41FA5}">
-                      <a16:colId xmlns:a16="http://schemas.microsoft.com/office/drawing/2014/main" xmlns="" val="875010954"/>
+                      <a16:colId xmlns="" xmlns:a16="http://schemas.microsoft.com/office/drawing/2014/main" val="875010954"/>
                     </a:ext>
                   </a:extLst>
                 </a:gridCol>
                 <a:gridCol w="823913">
                   <a:extLst>
                     <a:ext uri="{9D8B030D-6E8A-4147-A177-3AD203B41FA5}">
-                      <a16:colId xmlns:a16="http://schemas.microsoft.com/office/drawing/2014/main" xmlns="" val="1078558424"/>
+                      <a16:colId xmlns="" xmlns:a16="http://schemas.microsoft.com/office/drawing/2014/main" val="1078558424"/>
                     </a:ext>
                   </a:extLst>
                 </a:gridCol>
                 <a:gridCol w="1246433">
                   <a:extLst>
                     <a:ext uri="{9D8B030D-6E8A-4147-A177-3AD203B41FA5}">
-                      <a16:colId xmlns:a16="http://schemas.microsoft.com/office/drawing/2014/main" xmlns="" val="112756927"/>
+                      <a16:colId xmlns="" xmlns:a16="http://schemas.microsoft.com/office/drawing/2014/main" val="112756927"/>
                     </a:ext>
                   </a:extLst>
                 </a:gridCol>
                 <a:gridCol w="1919824">
                   <a:extLst>
                     <a:ext uri="{9D8B030D-6E8A-4147-A177-3AD203B41FA5}">
-                      <a16:colId xmlns:a16="http://schemas.microsoft.com/office/drawing/2014/main" xmlns="" val="4050224548"/>
+                      <a16:colId xmlns="" xmlns:a16="http://schemas.microsoft.com/office/drawing/2014/main" val="4050224548"/>
                     </a:ext>
                   </a:extLst>
                 </a:gridCol>
                 <a:gridCol w="1774583">
                   <a:extLst>
                     <a:ext uri="{9D8B030D-6E8A-4147-A177-3AD203B41FA5}">
-                      <a16:colId xmlns:a16="http://schemas.microsoft.com/office/drawing/2014/main" xmlns="" val="1071222725"/>
+                      <a16:colId xmlns="" xmlns:a16="http://schemas.microsoft.com/office/drawing/2014/main" val="1071222725"/>
                     </a:ext>
                   </a:extLst>
                 </a:gridCol>
                 <a:gridCol w="1526833">
                   <a:extLst>
                     <a:ext uri="{9D8B030D-6E8A-4147-A177-3AD203B41FA5}">
-                      <a16:colId xmlns:a16="http://schemas.microsoft.com/office/drawing/2014/main" xmlns="" val="4215464752"/>
+                      <a16:colId xmlns="" xmlns:a16="http://schemas.microsoft.com/office/drawing/2014/main" val="4215464752"/>
                     </a:ext>
                   </a:extLst>
                 </a:gridCol>
@@ -25584,7 +26180,7 @@
                 </a:tc>
                 <a:extLst>
                   <a:ext uri="{0D108BD9-81ED-4DB2-BD59-A6C34878D82A}">
-                    <a16:rowId xmlns:a16="http://schemas.microsoft.com/office/drawing/2014/main" xmlns="" val="1745891069"/>
+                    <a16:rowId xmlns="" xmlns:a16="http://schemas.microsoft.com/office/drawing/2014/main" val="1745891069"/>
                   </a:ext>
                 </a:extLst>
               </a:tr>
@@ -25803,7 +26399,7 @@
                 </a:tc>
                 <a:extLst>
                   <a:ext uri="{0D108BD9-81ED-4DB2-BD59-A6C34878D82A}">
-                    <a16:rowId xmlns:a16="http://schemas.microsoft.com/office/drawing/2014/main" xmlns="" val="3307466219"/>
+                    <a16:rowId xmlns="" xmlns:a16="http://schemas.microsoft.com/office/drawing/2014/main" val="3307466219"/>
                   </a:ext>
                 </a:extLst>
               </a:tr>
@@ -26008,7 +26604,7 @@
                 </a:tc>
                 <a:extLst>
                   <a:ext uri="{0D108BD9-81ED-4DB2-BD59-A6C34878D82A}">
-                    <a16:rowId xmlns:a16="http://schemas.microsoft.com/office/drawing/2014/main" xmlns="" val="2430767203"/>
+                    <a16:rowId xmlns="" xmlns:a16="http://schemas.microsoft.com/office/drawing/2014/main" val="2430767203"/>
                   </a:ext>
                 </a:extLst>
               </a:tr>
@@ -26231,7 +26827,7 @@
                 </a:tc>
                 <a:extLst>
                   <a:ext uri="{0D108BD9-81ED-4DB2-BD59-A6C34878D82A}">
-                    <a16:rowId xmlns:a16="http://schemas.microsoft.com/office/drawing/2014/main" xmlns="" val="460563303"/>
+                    <a16:rowId xmlns="" xmlns:a16="http://schemas.microsoft.com/office/drawing/2014/main" val="460563303"/>
                   </a:ext>
                 </a:extLst>
               </a:tr>
@@ -26454,7 +27050,7 @@
                 </a:tc>
                 <a:extLst>
                   <a:ext uri="{0D108BD9-81ED-4DB2-BD59-A6C34878D82A}">
-                    <a16:rowId xmlns:a16="http://schemas.microsoft.com/office/drawing/2014/main" xmlns="" val="3260662345"/>
+                    <a16:rowId xmlns="" xmlns:a16="http://schemas.microsoft.com/office/drawing/2014/main" val="3260662345"/>
                   </a:ext>
                 </a:extLst>
               </a:tr>
@@ -26677,7 +27273,7 @@
                 </a:tc>
                 <a:extLst>
                   <a:ext uri="{0D108BD9-81ED-4DB2-BD59-A6C34878D82A}">
-                    <a16:rowId xmlns:a16="http://schemas.microsoft.com/office/drawing/2014/main" xmlns="" val="3181831911"/>
+                    <a16:rowId xmlns="" xmlns:a16="http://schemas.microsoft.com/office/drawing/2014/main" val="3181831911"/>
                   </a:ext>
                 </a:extLst>
               </a:tr>
@@ -26900,7 +27496,7 @@
                 </a:tc>
                 <a:extLst>
                   <a:ext uri="{0D108BD9-81ED-4DB2-BD59-A6C34878D82A}">
-                    <a16:rowId xmlns:a16="http://schemas.microsoft.com/office/drawing/2014/main" xmlns="" val="1027403434"/>
+                    <a16:rowId xmlns="" xmlns:a16="http://schemas.microsoft.com/office/drawing/2014/main" val="1027403434"/>
                   </a:ext>
                 </a:extLst>
               </a:tr>
@@ -27110,7 +27706,7 @@
                 </a:tc>
                 <a:extLst>
                   <a:ext uri="{0D108BD9-81ED-4DB2-BD59-A6C34878D82A}">
-                    <a16:rowId xmlns:a16="http://schemas.microsoft.com/office/drawing/2014/main" xmlns="" val="2611242976"/>
+                    <a16:rowId xmlns="" xmlns:a16="http://schemas.microsoft.com/office/drawing/2014/main" val="2611242976"/>
                   </a:ext>
                 </a:extLst>
               </a:tr>
@@ -27357,7 +27953,7 @@
                 </a:tc>
                 <a:extLst>
                   <a:ext uri="{0D108BD9-81ED-4DB2-BD59-A6C34878D82A}">
-                    <a16:rowId xmlns:a16="http://schemas.microsoft.com/office/drawing/2014/main" xmlns="" val="1376843330"/>
+                    <a16:rowId xmlns="" xmlns:a16="http://schemas.microsoft.com/office/drawing/2014/main" val="1376843330"/>
                   </a:ext>
                 </a:extLst>
               </a:tr>
@@ -27580,7 +28176,7 @@
                 </a:tc>
                 <a:extLst>
                   <a:ext uri="{0D108BD9-81ED-4DB2-BD59-A6C34878D82A}">
-                    <a16:rowId xmlns:a16="http://schemas.microsoft.com/office/drawing/2014/main" xmlns="" val="1592789948"/>
+                    <a16:rowId xmlns="" xmlns:a16="http://schemas.microsoft.com/office/drawing/2014/main" val="1592789948"/>
                   </a:ext>
                 </a:extLst>
               </a:tr>
@@ -29130,7 +29726,7 @@
           <p:cNvPr id="3" name="Picture 2">
             <a:extLst>
               <a:ext uri="{FF2B5EF4-FFF2-40B4-BE49-F238E27FC236}">
-                <a16:creationId xmlns="" xmlns:a16="http://schemas.microsoft.com/office/drawing/2014/main" id="{B4399C38-6E07-41DC-8DEC-6BF8481CD6F3}"/>
+                <a16:creationId xmlns:a16="http://schemas.microsoft.com/office/drawing/2014/main" xmlns="" id="{B4399C38-6E07-41DC-8DEC-6BF8481CD6F3}"/>
               </a:ext>
             </a:extLst>
           </p:cNvPr>
@@ -29246,7 +29842,7 @@
           <p:cNvPr id="63" name="Picture 62">
             <a:extLst>
               <a:ext uri="{FF2B5EF4-FFF2-40B4-BE49-F238E27FC236}">
-                <a16:creationId xmlns="" xmlns:a16="http://schemas.microsoft.com/office/drawing/2014/main" id="{5B15DD52-47DC-4412-A2E6-A60F6687A2AA}"/>
+                <a16:creationId xmlns:a16="http://schemas.microsoft.com/office/drawing/2014/main" xmlns="" id="{5B15DD52-47DC-4412-A2E6-A60F6687A2AA}"/>
               </a:ext>
             </a:extLst>
           </p:cNvPr>
@@ -29282,7 +29878,7 @@
           <p:cNvPr id="106" name="Picture 105">
             <a:extLst>
               <a:ext uri="{FF2B5EF4-FFF2-40B4-BE49-F238E27FC236}">
-                <a16:creationId xmlns="" xmlns:a16="http://schemas.microsoft.com/office/drawing/2014/main" id="{14F6968E-F8BC-4C9E-8B85-4F59E9B70028}"/>
+                <a16:creationId xmlns:a16="http://schemas.microsoft.com/office/drawing/2014/main" xmlns="" id="{14F6968E-F8BC-4C9E-8B85-4F59E9B70028}"/>
               </a:ext>
             </a:extLst>
           </p:cNvPr>
@@ -29324,7 +29920,7 @@
           <p:cNvPr id="126" name="Picture 125">
             <a:extLst>
               <a:ext uri="{FF2B5EF4-FFF2-40B4-BE49-F238E27FC236}">
-                <a16:creationId xmlns="" xmlns:a16="http://schemas.microsoft.com/office/drawing/2014/main" id="{2F2210B8-E2C2-4C34-B1D8-515E754290CB}"/>
+                <a16:creationId xmlns:a16="http://schemas.microsoft.com/office/drawing/2014/main" xmlns="" id="{2F2210B8-E2C2-4C34-B1D8-515E754290CB}"/>
               </a:ext>
             </a:extLst>
           </p:cNvPr>
@@ -29360,7 +29956,7 @@
           <p:cNvPr id="127" name="Callout: Bent Line 126">
             <a:extLst>
               <a:ext uri="{FF2B5EF4-FFF2-40B4-BE49-F238E27FC236}">
-                <a16:creationId xmlns="" xmlns:a16="http://schemas.microsoft.com/office/drawing/2014/main" id="{397CF055-B331-413D-B5BB-07280E8153FD}"/>
+                <a16:creationId xmlns:a16="http://schemas.microsoft.com/office/drawing/2014/main" xmlns="" id="{397CF055-B331-413D-B5BB-07280E8153FD}"/>
               </a:ext>
             </a:extLst>
           </p:cNvPr>
@@ -29423,7 +30019,7 @@
           <p:cNvPr id="130" name="Callout: Bent Line 129">
             <a:extLst>
               <a:ext uri="{FF2B5EF4-FFF2-40B4-BE49-F238E27FC236}">
-                <a16:creationId xmlns="" xmlns:a16="http://schemas.microsoft.com/office/drawing/2014/main" id="{96D68CA9-C290-42A1-A7D4-EE0D7EC09841}"/>
+                <a16:creationId xmlns:a16="http://schemas.microsoft.com/office/drawing/2014/main" xmlns="" id="{96D68CA9-C290-42A1-A7D4-EE0D7EC09841}"/>
               </a:ext>
             </a:extLst>
           </p:cNvPr>
@@ -29481,7 +30077,7 @@
           <p:cNvPr id="131" name="Callout: Bent Line 130">
             <a:extLst>
               <a:ext uri="{FF2B5EF4-FFF2-40B4-BE49-F238E27FC236}">
-                <a16:creationId xmlns="" xmlns:a16="http://schemas.microsoft.com/office/drawing/2014/main" id="{A802EC55-C5E1-49FD-A1D8-34D9EAFBC27C}"/>
+                <a16:creationId xmlns:a16="http://schemas.microsoft.com/office/drawing/2014/main" xmlns="" id="{A802EC55-C5E1-49FD-A1D8-34D9EAFBC27C}"/>
               </a:ext>
             </a:extLst>
           </p:cNvPr>
@@ -29543,7 +30139,7 @@
           <p:cNvPr id="133" name="Callout: Bent Line 132">
             <a:extLst>
               <a:ext uri="{FF2B5EF4-FFF2-40B4-BE49-F238E27FC236}">
-                <a16:creationId xmlns="" xmlns:a16="http://schemas.microsoft.com/office/drawing/2014/main" id="{494B9882-814D-47EA-BA74-F87861720779}"/>
+                <a16:creationId xmlns:a16="http://schemas.microsoft.com/office/drawing/2014/main" xmlns="" id="{494B9882-814D-47EA-BA74-F87861720779}"/>
               </a:ext>
             </a:extLst>
           </p:cNvPr>
@@ -29605,7 +30201,7 @@
           <p:cNvPr id="134" name="TextBox 133">
             <a:extLst>
               <a:ext uri="{FF2B5EF4-FFF2-40B4-BE49-F238E27FC236}">
-                <a16:creationId xmlns="" xmlns:a16="http://schemas.microsoft.com/office/drawing/2014/main" id="{D74BA1D6-760F-4BF0-B768-1F8E70ABD577}"/>
+                <a16:creationId xmlns:a16="http://schemas.microsoft.com/office/drawing/2014/main" xmlns="" id="{D74BA1D6-760F-4BF0-B768-1F8E70ABD577}"/>
               </a:ext>
             </a:extLst>
           </p:cNvPr>
@@ -29644,7 +30240,7 @@
           <p:cNvPr id="135" name="TextBox 134">
             <a:extLst>
               <a:ext uri="{FF2B5EF4-FFF2-40B4-BE49-F238E27FC236}">
-                <a16:creationId xmlns="" xmlns:a16="http://schemas.microsoft.com/office/drawing/2014/main" id="{75730175-D07F-45EB-8271-B044C4A63E00}"/>
+                <a16:creationId xmlns:a16="http://schemas.microsoft.com/office/drawing/2014/main" xmlns="" id="{75730175-D07F-45EB-8271-B044C4A63E00}"/>
               </a:ext>
             </a:extLst>
           </p:cNvPr>
@@ -29683,7 +30279,7 @@
           <p:cNvPr id="137" name="Callout: Bent Line 136">
             <a:extLst>
               <a:ext uri="{FF2B5EF4-FFF2-40B4-BE49-F238E27FC236}">
-                <a16:creationId xmlns="" xmlns:a16="http://schemas.microsoft.com/office/drawing/2014/main" id="{3C9663B5-0E20-499F-9430-0E655D044E15}"/>
+                <a16:creationId xmlns:a16="http://schemas.microsoft.com/office/drawing/2014/main" xmlns="" id="{3C9663B5-0E20-499F-9430-0E655D044E15}"/>
               </a:ext>
             </a:extLst>
           </p:cNvPr>
@@ -29745,7 +30341,7 @@
           <p:cNvPr id="48" name="Picture 47">
             <a:extLst>
               <a:ext uri="{FF2B5EF4-FFF2-40B4-BE49-F238E27FC236}">
-                <a16:creationId xmlns="" xmlns:a16="http://schemas.microsoft.com/office/drawing/2014/main" id="{970396B5-9118-42A9-904D-F72BD292492F}"/>
+                <a16:creationId xmlns:a16="http://schemas.microsoft.com/office/drawing/2014/main" xmlns="" id="{970396B5-9118-42A9-904D-F72BD292492F}"/>
               </a:ext>
             </a:extLst>
           </p:cNvPr>
@@ -29891,7 +30487,7 @@
           <p:cNvPr id="4" name="Picture 3">
             <a:extLst>
               <a:ext uri="{FF2B5EF4-FFF2-40B4-BE49-F238E27FC236}">
-                <a16:creationId xmlns="" xmlns:a16="http://schemas.microsoft.com/office/drawing/2014/main" id="{09B31EB0-88C9-4158-8CC2-885407DCC438}"/>
+                <a16:creationId xmlns:a16="http://schemas.microsoft.com/office/drawing/2014/main" xmlns="" id="{09B31EB0-88C9-4158-8CC2-885407DCC438}"/>
               </a:ext>
             </a:extLst>
           </p:cNvPr>
@@ -29927,7 +30523,7 @@
           <p:cNvPr id="6" name="Speech Bubble: Rectangle with Corners Rounded 5">
             <a:extLst>
               <a:ext uri="{FF2B5EF4-FFF2-40B4-BE49-F238E27FC236}">
-                <a16:creationId xmlns="" xmlns:a16="http://schemas.microsoft.com/office/drawing/2014/main" id="{D5C8FBE0-8128-4C4E-A630-4581C1986965}"/>
+                <a16:creationId xmlns:a16="http://schemas.microsoft.com/office/drawing/2014/main" xmlns="" id="{D5C8FBE0-8128-4C4E-A630-4581C1986965}"/>
               </a:ext>
             </a:extLst>
           </p:cNvPr>
@@ -29978,7 +30574,7 @@
           <p:cNvPr id="17" name="Speech Bubble: Rectangle with Corners Rounded 16">
             <a:extLst>
               <a:ext uri="{FF2B5EF4-FFF2-40B4-BE49-F238E27FC236}">
-                <a16:creationId xmlns="" xmlns:a16="http://schemas.microsoft.com/office/drawing/2014/main" id="{36BFF22C-8B6F-479C-9A8A-785260030205}"/>
+                <a16:creationId xmlns:a16="http://schemas.microsoft.com/office/drawing/2014/main" xmlns="" id="{36BFF22C-8B6F-479C-9A8A-785260030205}"/>
               </a:ext>
             </a:extLst>
           </p:cNvPr>
@@ -30029,7 +30625,7 @@
           <p:cNvPr id="16" name="TextBox 15">
             <a:extLst>
               <a:ext uri="{FF2B5EF4-FFF2-40B4-BE49-F238E27FC236}">
-                <a16:creationId xmlns="" xmlns:a16="http://schemas.microsoft.com/office/drawing/2014/main" id="{EF788542-589B-4D4F-B65A-ED8F88F99952}"/>
+                <a16:creationId xmlns:a16="http://schemas.microsoft.com/office/drawing/2014/main" xmlns="" id="{EF788542-589B-4D4F-B65A-ED8F88F99952}"/>
               </a:ext>
             </a:extLst>
           </p:cNvPr>
@@ -30085,7 +30681,7 @@
           <p:cNvPr id="7" name="TextBox 6">
             <a:extLst>
               <a:ext uri="{FF2B5EF4-FFF2-40B4-BE49-F238E27FC236}">
-                <a16:creationId xmlns="" xmlns:a16="http://schemas.microsoft.com/office/drawing/2014/main" id="{7B7DD44E-72F6-4785-B494-655ACE3CCE3D}"/>
+                <a16:creationId xmlns:a16="http://schemas.microsoft.com/office/drawing/2014/main" xmlns="" id="{7B7DD44E-72F6-4785-B494-655ACE3CCE3D}"/>
               </a:ext>
             </a:extLst>
           </p:cNvPr>
@@ -30138,7 +30734,7 @@
           <p:cNvPr id="19" name="Speech Bubble: Rectangle with Corners Rounded 18">
             <a:extLst>
               <a:ext uri="{FF2B5EF4-FFF2-40B4-BE49-F238E27FC236}">
-                <a16:creationId xmlns="" xmlns:a16="http://schemas.microsoft.com/office/drawing/2014/main" id="{866C2C8C-0C6C-417B-8EE9-78420CA3542B}"/>
+                <a16:creationId xmlns:a16="http://schemas.microsoft.com/office/drawing/2014/main" xmlns="" id="{866C2C8C-0C6C-417B-8EE9-78420CA3542B}"/>
               </a:ext>
             </a:extLst>
           </p:cNvPr>
@@ -30189,7 +30785,7 @@
           <p:cNvPr id="8" name="TextBox 7">
             <a:extLst>
               <a:ext uri="{FF2B5EF4-FFF2-40B4-BE49-F238E27FC236}">
-                <a16:creationId xmlns="" xmlns:a16="http://schemas.microsoft.com/office/drawing/2014/main" id="{E1997BCC-AC66-4279-A67A-C85CAC10E7F9}"/>
+                <a16:creationId xmlns:a16="http://schemas.microsoft.com/office/drawing/2014/main" xmlns="" id="{E1997BCC-AC66-4279-A67A-C85CAC10E7F9}"/>
               </a:ext>
             </a:extLst>
           </p:cNvPr>
@@ -30245,7 +30841,7 @@
           <p:cNvPr id="21" name="Speech Bubble: Rectangle with Corners Rounded 20">
             <a:extLst>
               <a:ext uri="{FF2B5EF4-FFF2-40B4-BE49-F238E27FC236}">
-                <a16:creationId xmlns="" xmlns:a16="http://schemas.microsoft.com/office/drawing/2014/main" id="{DD220F97-C522-4A0A-8410-A47E2F0DEDFF}"/>
+                <a16:creationId xmlns:a16="http://schemas.microsoft.com/office/drawing/2014/main" xmlns="" id="{DD220F97-C522-4A0A-8410-A47E2F0DEDFF}"/>
               </a:ext>
             </a:extLst>
           </p:cNvPr>
@@ -30296,7 +30892,7 @@
           <p:cNvPr id="10" name="TextBox 9">
             <a:extLst>
               <a:ext uri="{FF2B5EF4-FFF2-40B4-BE49-F238E27FC236}">
-                <a16:creationId xmlns="" xmlns:a16="http://schemas.microsoft.com/office/drawing/2014/main" id="{D7B58DCE-D84F-4A36-B35D-3526714DA155}"/>
+                <a16:creationId xmlns:a16="http://schemas.microsoft.com/office/drawing/2014/main" xmlns="" id="{D7B58DCE-D84F-4A36-B35D-3526714DA155}"/>
               </a:ext>
             </a:extLst>
           </p:cNvPr>
@@ -30344,7 +30940,7 @@
           <p:cNvPr id="14" name="Picture 13">
             <a:extLst>
               <a:ext uri="{FF2B5EF4-FFF2-40B4-BE49-F238E27FC236}">
-                <a16:creationId xmlns="" xmlns:a16="http://schemas.microsoft.com/office/drawing/2014/main" id="{DD1FBBBF-5DC7-4566-83B7-11724A262B7D}"/>
+                <a16:creationId xmlns:a16="http://schemas.microsoft.com/office/drawing/2014/main" xmlns="" id="{DD1FBBBF-5DC7-4566-83B7-11724A262B7D}"/>
               </a:ext>
             </a:extLst>
           </p:cNvPr>
@@ -30485,7 +31081,7 @@
           <p:cNvPr id="6" name="Picture 5">
             <a:extLst>
               <a:ext uri="{FF2B5EF4-FFF2-40B4-BE49-F238E27FC236}">
-                <a16:creationId xmlns="" xmlns:a16="http://schemas.microsoft.com/office/drawing/2014/main" id="{782A8D85-5ED8-43C3-BC0F-6BFC4EA00A62}"/>
+                <a16:creationId xmlns:a16="http://schemas.microsoft.com/office/drawing/2014/main" xmlns="" id="{782A8D85-5ED8-43C3-BC0F-6BFC4EA00A62}"/>
               </a:ext>
             </a:extLst>
           </p:cNvPr>
@@ -30523,7 +31119,7 @@
               <p:cNvPr id="13" name="TextBox 12">
                 <a:extLst>
                   <a:ext uri="{FF2B5EF4-FFF2-40B4-BE49-F238E27FC236}">
-                    <a16:creationId xmlns="" xmlns:a16="http://schemas.microsoft.com/office/drawing/2014/main" id="{B4966AAC-C7DE-4EAC-8440-706C54E5BE9B}"/>
+                    <a16:creationId xmlns:a16="http://schemas.microsoft.com/office/drawing/2014/main" xmlns="" id="{B4966AAC-C7DE-4EAC-8440-706C54E5BE9B}"/>
                   </a:ext>
                 </a:extLst>
               </p:cNvPr>
@@ -30797,7 +31393,7 @@
               <p:cNvPr id="15" name="TextBox 14">
                 <a:extLst>
                   <a:ext uri="{FF2B5EF4-FFF2-40B4-BE49-F238E27FC236}">
-                    <a16:creationId xmlns="" xmlns:a16="http://schemas.microsoft.com/office/drawing/2014/main" id="{370A66A4-B008-4BCF-8B8A-688563E19E48}"/>
+                    <a16:creationId xmlns:a16="http://schemas.microsoft.com/office/drawing/2014/main" xmlns="" id="{370A66A4-B008-4BCF-8B8A-688563E19E48}"/>
                   </a:ext>
                 </a:extLst>
               </p:cNvPr>
@@ -31120,7 +31716,7 @@
               <p:cNvPr id="16" name="TextBox 15">
                 <a:extLst>
                   <a:ext uri="{FF2B5EF4-FFF2-40B4-BE49-F238E27FC236}">
-                    <a16:creationId xmlns="" xmlns:a16="http://schemas.microsoft.com/office/drawing/2014/main" id="{9CA80DB1-7C6A-4B96-8FC5-0D3801EF5660}"/>
+                    <a16:creationId xmlns:a16="http://schemas.microsoft.com/office/drawing/2014/main" xmlns="" id="{9CA80DB1-7C6A-4B96-8FC5-0D3801EF5660}"/>
                   </a:ext>
                 </a:extLst>
               </p:cNvPr>
@@ -31364,7 +31960,7 @@
               <p:cNvPr id="17" name="TextBox 16">
                 <a:extLst>
                   <a:ext uri="{FF2B5EF4-FFF2-40B4-BE49-F238E27FC236}">
-                    <a16:creationId xmlns="" xmlns:a16="http://schemas.microsoft.com/office/drawing/2014/main" id="{5ED90BD9-546E-4CD3-93BE-10D2833E41BC}"/>
+                    <a16:creationId xmlns:a16="http://schemas.microsoft.com/office/drawing/2014/main" xmlns="" id="{5ED90BD9-546E-4CD3-93BE-10D2833E41BC}"/>
                   </a:ext>
                 </a:extLst>
               </p:cNvPr>
@@ -31608,7 +32204,7 @@
           <p:cNvPr id="19" name="Rectangle 18">
             <a:extLst>
               <a:ext uri="{FF2B5EF4-FFF2-40B4-BE49-F238E27FC236}">
-                <a16:creationId xmlns="" xmlns:a16="http://schemas.microsoft.com/office/drawing/2014/main" id="{B44EA830-46C1-44BE-A602-6A44AB9FC00D}"/>
+                <a16:creationId xmlns:a16="http://schemas.microsoft.com/office/drawing/2014/main" xmlns="" id="{B44EA830-46C1-44BE-A602-6A44AB9FC00D}"/>
               </a:ext>
             </a:extLst>
           </p:cNvPr>
@@ -31671,7 +32267,7 @@
               <p:cNvPr id="18" name="TextBox 17">
                 <a:extLst>
                   <a:ext uri="{FF2B5EF4-FFF2-40B4-BE49-F238E27FC236}">
-                    <a16:creationId xmlns="" xmlns:a16="http://schemas.microsoft.com/office/drawing/2014/main" id="{3418578F-786F-400C-954C-DB4CD28CB555}"/>
+                    <a16:creationId xmlns:a16="http://schemas.microsoft.com/office/drawing/2014/main" xmlns="" id="{3418578F-786F-400C-954C-DB4CD28CB555}"/>
                   </a:ext>
                 </a:extLst>
               </p:cNvPr>
@@ -31799,7 +32395,7 @@
           <p:cNvPr id="21" name="Rectangle 20">
             <a:extLst>
               <a:ext uri="{FF2B5EF4-FFF2-40B4-BE49-F238E27FC236}">
-                <a16:creationId xmlns="" xmlns:a16="http://schemas.microsoft.com/office/drawing/2014/main" id="{351BAECD-40B7-4D81-A0AE-E80772DDED46}"/>
+                <a16:creationId xmlns:a16="http://schemas.microsoft.com/office/drawing/2014/main" xmlns="" id="{351BAECD-40B7-4D81-A0AE-E80772DDED46}"/>
               </a:ext>
             </a:extLst>
           </p:cNvPr>
@@ -31860,7 +32456,7 @@
           <p:cNvPr id="22" name="Rectangle 21">
             <a:extLst>
               <a:ext uri="{FF2B5EF4-FFF2-40B4-BE49-F238E27FC236}">
-                <a16:creationId xmlns="" xmlns:a16="http://schemas.microsoft.com/office/drawing/2014/main" id="{B8926D9D-C051-41E4-BB0E-A3D001131A4D}"/>
+                <a16:creationId xmlns:a16="http://schemas.microsoft.com/office/drawing/2014/main" xmlns="" id="{B8926D9D-C051-41E4-BB0E-A3D001131A4D}"/>
               </a:ext>
             </a:extLst>
           </p:cNvPr>
@@ -31923,7 +32519,7 @@
               <p:cNvPr id="20" name="TextBox 19">
                 <a:extLst>
                   <a:ext uri="{FF2B5EF4-FFF2-40B4-BE49-F238E27FC236}">
-                    <a16:creationId xmlns="" xmlns:a16="http://schemas.microsoft.com/office/drawing/2014/main" id="{C632BA72-1FAD-4BBB-BE68-45268DED4DF5}"/>
+                    <a16:creationId xmlns:a16="http://schemas.microsoft.com/office/drawing/2014/main" xmlns="" id="{C632BA72-1FAD-4BBB-BE68-45268DED4DF5}"/>
                   </a:ext>
                 </a:extLst>
               </p:cNvPr>
@@ -32087,7 +32683,7 @@
           <p:cNvPr id="24" name="Rectangle 23">
             <a:extLst>
               <a:ext uri="{FF2B5EF4-FFF2-40B4-BE49-F238E27FC236}">
-                <a16:creationId xmlns="" xmlns:a16="http://schemas.microsoft.com/office/drawing/2014/main" id="{EF78FFFB-757F-4F2C-B5BC-8FBCAE428F0A}"/>
+                <a16:creationId xmlns:a16="http://schemas.microsoft.com/office/drawing/2014/main" xmlns="" id="{EF78FFFB-757F-4F2C-B5BC-8FBCAE428F0A}"/>
               </a:ext>
             </a:extLst>
           </p:cNvPr>
@@ -32150,7 +32746,7 @@
               <p:cNvPr id="23" name="TextBox 22">
                 <a:extLst>
                   <a:ext uri="{FF2B5EF4-FFF2-40B4-BE49-F238E27FC236}">
-                    <a16:creationId xmlns="" xmlns:a16="http://schemas.microsoft.com/office/drawing/2014/main" id="{7CBF62CC-10DC-45E3-89A6-5DB457CE75DD}"/>
+                    <a16:creationId xmlns:a16="http://schemas.microsoft.com/office/drawing/2014/main" xmlns="" id="{7CBF62CC-10DC-45E3-89A6-5DB457CE75DD}"/>
                   </a:ext>
                 </a:extLst>
               </p:cNvPr>
@@ -32271,7 +32867,7 @@
               <p:cNvPr id="25" name="TextBox 24">
                 <a:extLst>
                   <a:ext uri="{FF2B5EF4-FFF2-40B4-BE49-F238E27FC236}">
-                    <a16:creationId xmlns="" xmlns:a16="http://schemas.microsoft.com/office/drawing/2014/main" id="{E3EDA271-5D49-48B9-8197-719E2BCA1C06}"/>
+                    <a16:creationId xmlns:a16="http://schemas.microsoft.com/office/drawing/2014/main" xmlns="" id="{E3EDA271-5D49-48B9-8197-719E2BCA1C06}"/>
                   </a:ext>
                 </a:extLst>
               </p:cNvPr>
@@ -32924,7 +33520,39 @@
                   <a:schemeClr val="tx2"/>
                 </a:solidFill>
               </a:rPr>
-              <a:t> = 0</a:t>
+              <a:t> </a:t>
+            </a:r>
+            <a:r>
+              <a:rPr lang="en-US" sz="2800" dirty="0" smtClean="0">
+                <a:solidFill>
+                  <a:schemeClr val="tx2"/>
+                </a:solidFill>
+              </a:rPr>
+              <a:t>// </a:t>
+            </a:r>
+            <a:r>
+              <a:rPr lang="en-US" sz="2800" dirty="0" err="1" smtClean="0">
+                <a:solidFill>
+                  <a:schemeClr val="tx2"/>
+                </a:solidFill>
+              </a:rPr>
+              <a:t>inicial</a:t>
+            </a:r>
+            <a:r>
+              <a:rPr lang="en-US" sz="2800" dirty="0" smtClean="0">
+                <a:solidFill>
+                  <a:schemeClr val="tx2"/>
+                </a:solidFill>
+              </a:rPr>
+              <a:t> value = </a:t>
+            </a:r>
+            <a:r>
+              <a:rPr lang="en-US" sz="2800" dirty="0" smtClean="0">
+                <a:solidFill>
+                  <a:schemeClr val="tx2"/>
+                </a:solidFill>
+              </a:rPr>
+              <a:t>0</a:t>
             </a:r>
             <a:endParaRPr lang="en-US" sz="2800" dirty="0">
               <a:solidFill>
@@ -33408,7 +34036,7 @@
                   <a:schemeClr val="tx2"/>
                 </a:solidFill>
               </a:rPr>
-              <a:t>{time, value}: ordered </a:t>
+              <a:t> //ordered </a:t>
             </a:r>
             <a:r>
               <a:rPr lang="en-US" b="1" dirty="0" smtClean="0">
@@ -39433,6 +40061,15 @@
 </file>
 
 <file path=customXml/item1.xml><?xml version="1.0" encoding="utf-8"?>
+<?mso-contentType ?>
+<FormTemplates xmlns="http://schemas.microsoft.com/sharepoint/v3/contenttype/forms">
+  <Display>DocumentLibraryForm</Display>
+  <Edit>AssetEditForm</Edit>
+  <New>DocumentLibraryForm</New>
+</FormTemplates>
+</file>
+
+<file path=customXml/item2.xml><?xml version="1.0" encoding="utf-8"?>
 <p:properties xmlns:p="http://schemas.microsoft.com/office/2006/metadata/properties" xmlns:xsi="http://www.w3.org/2001/XMLSchema-instance" xmlns:pc="http://schemas.microsoft.com/office/infopath/2007/PartnerControls">
   <documentManagement>
     <APDescription xmlns="4873beb7-5857-4685-be1f-d57550cc96cc" xsi:nil="true"/>
@@ -39556,15 +40193,6 @@
     <UANotes xmlns="4873beb7-5857-4685-be1f-d57550cc96cc" xsi:nil="true"/>
   </documentManagement>
 </p:properties>
-</file>
-
-<file path=customXml/item2.xml><?xml version="1.0" encoding="utf-8"?>
-<?mso-contentType ?>
-<FormTemplates xmlns="http://schemas.microsoft.com/sharepoint/v3/contenttype/forms">
-  <Display>DocumentLibraryForm</Display>
-  <Edit>AssetEditForm</Edit>
-  <New>DocumentLibraryForm</New>
-</FormTemplates>
 </file>
 
 <file path=customXml/item3.xml><?xml version="1.0" encoding="utf-8"?>
@@ -40608,6 +41236,14 @@
 </file>
 
 <file path=customXml/itemProps1.xml><?xml version="1.0" encoding="utf-8"?>
+<ds:datastoreItem xmlns:ds="http://schemas.openxmlformats.org/officeDocument/2006/customXml" ds:itemID="{561E720F-F05D-4536-9C34-0CFCED65D3B7}">
+  <ds:schemaRefs>
+    <ds:schemaRef ds:uri="http://schemas.microsoft.com/sharepoint/v3/contenttype/forms"/>
+  </ds:schemaRefs>
+</ds:datastoreItem>
+</file>
+
+<file path=customXml/itemProps2.xml><?xml version="1.0" encoding="utf-8"?>
 <ds:datastoreItem xmlns:ds="http://schemas.openxmlformats.org/officeDocument/2006/customXml" ds:itemID="{8CDDBB83-77C1-4099-A0AA-289882E745E2}">
   <ds:schemaRefs>
     <ds:schemaRef ds:uri="http://schemas.microsoft.com/office/2006/metadata/properties"/>
@@ -40619,14 +41255,6 @@
     <ds:schemaRef ds:uri="http://purl.org/dc/dcmitype/"/>
     <ds:schemaRef ds:uri="http://purl.org/dc/terms/"/>
     <ds:schemaRef ds:uri="http://www.w3.org/XML/1998/namespace"/>
-  </ds:schemaRefs>
-</ds:datastoreItem>
-</file>
-
-<file path=customXml/itemProps2.xml><?xml version="1.0" encoding="utf-8"?>
-<ds:datastoreItem xmlns:ds="http://schemas.openxmlformats.org/officeDocument/2006/customXml" ds:itemID="{561E720F-F05D-4536-9C34-0CFCED65D3B7}">
-  <ds:schemaRefs>
-    <ds:schemaRef ds:uri="http://schemas.microsoft.com/sharepoint/v3/contenttype/forms"/>
   </ds:schemaRefs>
 </ds:datastoreItem>
 </file>

</xml_diff>